<commit_message>
Complete draft to do a little testing on
</commit_message>
<xml_diff>
--- a/slides/0_workshop_opening.pptx
+++ b/slides/0_workshop_opening.pptx
@@ -13,7 +13,6 @@
     <p:sldId id="261" r:id="rId7"/>
     <p:sldId id="262" r:id="rId8"/>
     <p:sldId id="263" r:id="rId9"/>
-    <p:sldId id="264" r:id="rId10"/>
   </p:sldIdLst>
   <p:sldSz cx="12192000" cy="6858000"/>
   <p:notesSz cx="6858000" cy="9144000"/>
@@ -3702,11 +3701,16 @@
             </a:pPr>
             <a:r>
               <a:rPr i="1"/>
-              <a:t>Can use a different ppt template! This is draft!</a:t>
-            </a:r>
-            <a:r>
-              <a:rPr/>
-              <a:t> Link to RStudioCloud on every slide</a:t>
+              <a:t>Can use a different ppt template! This is a draft!</a:t>
+            </a:r>
+          </a:p>
+          <a:p>
+            <a:pPr lvl="0" marL="0" indent="0">
+              <a:buNone/>
+            </a:pPr>
+            <a:r>
+              <a:rPr/>
+              <a:t>Link to RStudioCloud on every slide</a:t>
             </a:r>
           </a:p>
         </p:txBody>
@@ -3764,6 +3768,46 @@
           </a:p>
         </p:txBody>
       </p:sp>
+      <p:sp>
+        <p:nvSpPr>
+          <p:cNvPr id="3" name="Content Placeholder 2">
+            <a:extLst>
+              <a:ext uri="{FF2B5EF4-FFF2-40B4-BE49-F238E27FC236}">
+                <a16:creationId xmlns:a16="http://schemas.microsoft.com/office/drawing/2014/main" id="{A25E1A85-B87A-774D-8127-DDB79A00C24D}"/>
+              </a:ext>
+            </a:extLst>
+          </p:cNvPr>
+          <p:cNvSpPr>
+            <a:spLocks noGrp="1"/>
+          </p:cNvSpPr>
+          <p:nvPr>
+            <p:ph idx="1"/>
+          </p:nvPr>
+        </p:nvSpPr>
+        <p:spPr/>
+        <p:txBody>
+          <a:bodyPr/>
+          <a:lstStyle/>
+          <a:p>
+            <a:pPr lvl="0" marL="1270000" indent="0">
+              <a:buNone/>
+            </a:pPr>
+            <a:r>
+              <a:rPr sz="1800">
+                <a:latin typeface="Courier"/>
+              </a:rPr>
+              <a:t>##        time                   event
+## 1 2:00-2:15      Welcome and Intros
+## 2 2:15-2:30  Intro to data cleaning
+## 3 2:30-2:45                   Break
+## 4 2:45-3:30 Data cleaning exercises
+## 5 3:30-3:45                   Break
+## 6 3:45-4:45      Data visualization
+## 7 4:45-5:00                Goodbye!</a:t>
+            </a:r>
+          </a:p>
+        </p:txBody>
+      </p:sp>
     </p:spTree>
   </p:cSld>
 </p:sld>
@@ -3812,46 +3856,7 @@
             </a:pPr>
             <a:r>
               <a:rPr/>
-              <a:t>Intro</a:t>
-            </a:r>
-            <a:r>
-              <a:rPr/>
-              <a:t> </a:t>
-            </a:r>
-            <a:r>
-              <a:rPr/>
               <a:t>Jake</a:t>
-            </a:r>
-          </a:p>
-        </p:txBody>
-      </p:sp>
-      <p:sp>
-        <p:nvSpPr>
-          <p:cNvPr id="3" name="Content Placeholder 2">
-            <a:extLst>
-              <a:ext uri="{FF2B5EF4-FFF2-40B4-BE49-F238E27FC236}">
-                <a16:creationId xmlns:a16="http://schemas.microsoft.com/office/drawing/2014/main" id="{A25E1A85-B87A-774D-8127-DDB79A00C24D}"/>
-              </a:ext>
-            </a:extLst>
-          </p:cNvPr>
-          <p:cNvSpPr>
-            <a:spLocks noGrp="1"/>
-          </p:cNvSpPr>
-          <p:nvPr>
-            <p:ph idx="1"/>
-          </p:nvPr>
-        </p:nvSpPr>
-        <p:spPr/>
-        <p:txBody>
-          <a:bodyPr/>
-          <a:lstStyle/>
-          <a:p>
-            <a:pPr lvl="0" marL="0" indent="0">
-              <a:buNone/>
-            </a:pPr>
-            <a:r>
-              <a:rPr/>
-              <a:t>Link to RStudioCloud on every slide</a:t>
             </a:r>
           </a:p>
         </p:txBody>
@@ -3904,14 +3909,6 @@
             </a:pPr>
             <a:r>
               <a:rPr/>
-              <a:t>Intro</a:t>
-            </a:r>
-            <a:r>
-              <a:rPr/>
-              <a:t> </a:t>
-            </a:r>
-            <a:r>
-              <a:rPr/>
               <a:t>Alice</a:t>
             </a:r>
           </a:p>
@@ -3943,7 +3940,25 @@
             </a:pPr>
             <a:r>
               <a:rPr/>
-              <a:t>Link to RStudioCloud on every slide</a:t>
+              <a:t>Hello! I am a computational biologist that uses R to better understand disease at the molecular level. I work at Bristol Myers Squibb in Princeton, NJ.</a:t>
+            </a:r>
+          </a:p>
+          <a:p>
+            <a:pPr lvl="0" marL="0" indent="0">
+              <a:buNone/>
+            </a:pPr>
+            <a:r>
+              <a:rPr/>
+              <a:t>github.com/awalsh17</a:t>
+            </a:r>
+          </a:p>
+          <a:p>
+            <a:pPr lvl="0" marL="0" indent="0">
+              <a:buNone/>
+            </a:pPr>
+            <a:r>
+              <a:rPr/>
+              <a:t>@sciencealice</a:t>
             </a:r>
           </a:p>
         </p:txBody>
@@ -4012,7 +4027,15 @@
             </a:r>
             <a:r>
               <a:rPr/>
-              <a:t>Tidyverse</a:t>
+              <a:t>the</a:t>
+            </a:r>
+            <a:r>
+              <a:rPr/>
+              <a:t> </a:t>
+            </a:r>
+            <a:r>
+              <a:rPr/>
+              <a:t>Tidyverse?</a:t>
             </a:r>
           </a:p>
         </p:txBody>
@@ -4151,7 +4174,31 @@
             </a:pPr>
             <a:r>
               <a:rPr/>
-              <a:t>Intro</a:t>
+              <a:t>Some</a:t>
+            </a:r>
+            <a:r>
+              <a:rPr/>
+              <a:t> </a:t>
+            </a:r>
+            <a:r>
+              <a:rPr/>
+              <a:t>important</a:t>
+            </a:r>
+            <a:r>
+              <a:rPr/>
+              <a:t> </a:t>
+            </a:r>
+            <a:r>
+              <a:rPr/>
+              <a:t>intro</a:t>
+            </a:r>
+            <a:r>
+              <a:rPr/>
+              <a:t> </a:t>
+            </a:r>
+            <a:r>
+              <a:rPr/>
+              <a:t>notes!</a:t>
             </a:r>
           </a:p>
         </p:txBody>
@@ -4177,10 +4224,12 @@
           <a:bodyPr/>
           <a:lstStyle/>
           <a:p>
-            <a:pPr lvl="1"/>
-            <a:r>
-              <a:rPr/>
-              <a:t>what is </a:t>
+            <a:pPr lvl="0" marL="0" indent="0">
+              <a:buNone/>
+            </a:pPr>
+            <a:r>
+              <a:rPr/>
+              <a:t>What is </a:t>
             </a:r>
             <a:r>
               <a:rPr sz="1800">
@@ -4199,7 +4248,273 @@
             </a:pPr>
             <a:r>
               <a:rPr/>
-              <a:t>shortcut = ctrl+shift+m</a:t>
+              <a:t>This is the “pipe operator”. It is a way to chain multiple operations together.</a:t>
+            </a:r>
+          </a:p>
+          <a:p>
+            <a:pPr lvl="0" marL="1270000" indent="0">
+              <a:buNone/>
+            </a:pPr>
+            <a:r>
+              <a:rPr sz="1800" i="1">
+                <a:solidFill>
+                  <a:srgbClr val="60A0B0"/>
+                </a:solidFill>
+                <a:latin typeface="Courier"/>
+              </a:rPr>
+              <a:t># Without pipe</a:t>
+            </a:r>
+            <a:br/>
+            <a:r>
+              <a:rPr sz="1800" b="1">
+                <a:solidFill>
+                  <a:srgbClr val="007020"/>
+                </a:solidFill>
+                <a:latin typeface="Courier"/>
+              </a:rPr>
+              <a:t>round</a:t>
+            </a:r>
+            <a:r>
+              <a:rPr sz="1800">
+                <a:latin typeface="Courier"/>
+              </a:rPr>
+              <a:t>(</a:t>
+            </a:r>
+            <a:r>
+              <a:rPr sz="1800" b="1">
+                <a:solidFill>
+                  <a:srgbClr val="007020"/>
+                </a:solidFill>
+                <a:latin typeface="Courier"/>
+              </a:rPr>
+              <a:t>exp</a:t>
+            </a:r>
+            <a:r>
+              <a:rPr sz="1800">
+                <a:latin typeface="Courier"/>
+              </a:rPr>
+              <a:t>(</a:t>
+            </a:r>
+            <a:r>
+              <a:rPr sz="1800" b="1">
+                <a:solidFill>
+                  <a:srgbClr val="007020"/>
+                </a:solidFill>
+                <a:latin typeface="Courier"/>
+              </a:rPr>
+              <a:t>diff</a:t>
+            </a:r>
+            <a:r>
+              <a:rPr sz="1800">
+                <a:latin typeface="Courier"/>
+              </a:rPr>
+              <a:t>(</a:t>
+            </a:r>
+            <a:r>
+              <a:rPr sz="1800" b="1">
+                <a:solidFill>
+                  <a:srgbClr val="007020"/>
+                </a:solidFill>
+                <a:latin typeface="Courier"/>
+              </a:rPr>
+              <a:t>log</a:t>
+            </a:r>
+            <a:r>
+              <a:rPr sz="1800">
+                <a:latin typeface="Courier"/>
+              </a:rPr>
+              <a:t>(x))), </a:t>
+            </a:r>
+            <a:r>
+              <a:rPr sz="1800">
+                <a:solidFill>
+                  <a:srgbClr val="40A070"/>
+                </a:solidFill>
+                <a:latin typeface="Courier"/>
+              </a:rPr>
+              <a:t>1</a:t>
+            </a:r>
+            <a:r>
+              <a:rPr sz="1800">
+                <a:latin typeface="Courier"/>
+              </a:rPr>
+              <a:t>)</a:t>
+            </a:r>
+            <a:br/>
+            <a:r>
+              <a:rPr sz="1800" i="1">
+                <a:solidFill>
+                  <a:srgbClr val="60A0B0"/>
+                </a:solidFill>
+                <a:latin typeface="Courier"/>
+              </a:rPr>
+              <a:t># With pipe</a:t>
+            </a:r>
+            <a:br/>
+            <a:r>
+              <a:rPr sz="1800">
+                <a:latin typeface="Courier"/>
+              </a:rPr>
+              <a:t>x </a:t>
+            </a:r>
+            <a:r>
+              <a:rPr sz="1800">
+                <a:solidFill>
+                  <a:srgbClr val="666666"/>
+                </a:solidFill>
+                <a:latin typeface="Courier"/>
+              </a:rPr>
+              <a:t>%&gt;%</a:t>
+            </a:r>
+            <a:r>
+              <a:rPr sz="1800">
+                <a:solidFill>
+                  <a:srgbClr val="4070A0"/>
+                </a:solidFill>
+                <a:latin typeface="Courier"/>
+              </a:rPr>
+              <a:t> </a:t>
+            </a:r>
+            <a:r>
+              <a:rPr sz="1800" b="1">
+                <a:solidFill>
+                  <a:srgbClr val="007020"/>
+                </a:solidFill>
+                <a:latin typeface="Courier"/>
+              </a:rPr>
+              <a:t>log</a:t>
+            </a:r>
+            <a:r>
+              <a:rPr sz="1800">
+                <a:latin typeface="Courier"/>
+              </a:rPr>
+              <a:t>() </a:t>
+            </a:r>
+            <a:r>
+              <a:rPr sz="1800">
+                <a:solidFill>
+                  <a:srgbClr val="666666"/>
+                </a:solidFill>
+                <a:latin typeface="Courier"/>
+              </a:rPr>
+              <a:t>%&gt;%</a:t>
+            </a:r>
+            <a:br/>
+            <a:r>
+              <a:rPr sz="1800">
+                <a:solidFill>
+                  <a:srgbClr val="4070A0"/>
+                </a:solidFill>
+                <a:latin typeface="Courier"/>
+              </a:rPr>
+              <a:t>    </a:t>
+            </a:r>
+            <a:r>
+              <a:rPr sz="1800" b="1">
+                <a:solidFill>
+                  <a:srgbClr val="007020"/>
+                </a:solidFill>
+                <a:latin typeface="Courier"/>
+              </a:rPr>
+              <a:t>diff</a:t>
+            </a:r>
+            <a:r>
+              <a:rPr sz="1800">
+                <a:latin typeface="Courier"/>
+              </a:rPr>
+              <a:t>() </a:t>
+            </a:r>
+            <a:r>
+              <a:rPr sz="1800">
+                <a:solidFill>
+                  <a:srgbClr val="666666"/>
+                </a:solidFill>
+                <a:latin typeface="Courier"/>
+              </a:rPr>
+              <a:t>%&gt;%</a:t>
+            </a:r>
+            <a:br/>
+            <a:r>
+              <a:rPr sz="1800">
+                <a:solidFill>
+                  <a:srgbClr val="4070A0"/>
+                </a:solidFill>
+                <a:latin typeface="Courier"/>
+              </a:rPr>
+              <a:t>    </a:t>
+            </a:r>
+            <a:r>
+              <a:rPr sz="1800" b="1">
+                <a:solidFill>
+                  <a:srgbClr val="007020"/>
+                </a:solidFill>
+                <a:latin typeface="Courier"/>
+              </a:rPr>
+              <a:t>exp</a:t>
+            </a:r>
+            <a:r>
+              <a:rPr sz="1800">
+                <a:latin typeface="Courier"/>
+              </a:rPr>
+              <a:t>() </a:t>
+            </a:r>
+            <a:r>
+              <a:rPr sz="1800">
+                <a:solidFill>
+                  <a:srgbClr val="666666"/>
+                </a:solidFill>
+                <a:latin typeface="Courier"/>
+              </a:rPr>
+              <a:t>%&gt;%</a:t>
+            </a:r>
+            <a:br/>
+            <a:r>
+              <a:rPr sz="1800">
+                <a:solidFill>
+                  <a:srgbClr val="4070A0"/>
+                </a:solidFill>
+                <a:latin typeface="Courier"/>
+              </a:rPr>
+              <a:t>    </a:t>
+            </a:r>
+            <a:r>
+              <a:rPr sz="1800" b="1">
+                <a:solidFill>
+                  <a:srgbClr val="007020"/>
+                </a:solidFill>
+                <a:latin typeface="Courier"/>
+              </a:rPr>
+              <a:t>round</a:t>
+            </a:r>
+            <a:r>
+              <a:rPr sz="1800">
+                <a:latin typeface="Courier"/>
+              </a:rPr>
+              <a:t>(</a:t>
+            </a:r>
+            <a:r>
+              <a:rPr sz="1800">
+                <a:solidFill>
+                  <a:srgbClr val="40A070"/>
+                </a:solidFill>
+                <a:latin typeface="Courier"/>
+              </a:rPr>
+              <a:t>1</a:t>
+            </a:r>
+            <a:r>
+              <a:rPr sz="1800">
+                <a:latin typeface="Courier"/>
+              </a:rPr>
+              <a:t>)</a:t>
+            </a:r>
+          </a:p>
+          <a:p>
+            <a:pPr lvl="0" marL="0" indent="0">
+              <a:buNone/>
+            </a:pPr>
+            <a:r>
+              <a:rPr b="1"/>
+              <a:t>keyboard shortcut = ctrl+shift+m</a:t>
             </a:r>
           </a:p>
         </p:txBody>
@@ -4252,100 +4567,7 @@
             </a:pPr>
             <a:r>
               <a:rPr/>
-              <a:t>Schedule</a:t>
-            </a:r>
-          </a:p>
-        </p:txBody>
-      </p:sp>
-      <p:sp>
-        <p:nvSpPr>
-          <p:cNvPr id="3" name="Content Placeholder 2">
-            <a:extLst>
-              <a:ext uri="{FF2B5EF4-FFF2-40B4-BE49-F238E27FC236}">
-                <a16:creationId xmlns:a16="http://schemas.microsoft.com/office/drawing/2014/main" id="{A25E1A85-B87A-774D-8127-DDB79A00C24D}"/>
-              </a:ext>
-            </a:extLst>
-          </p:cNvPr>
-          <p:cNvSpPr>
-            <a:spLocks noGrp="1"/>
-          </p:cNvSpPr>
-          <p:nvPr>
-            <p:ph idx="1"/>
-          </p:nvPr>
-        </p:nvSpPr>
-        <p:spPr/>
-        <p:txBody>
-          <a:bodyPr/>
-          <a:lstStyle/>
-          <a:p>
-            <a:pPr lvl="0" marL="1270000" indent="0">
-              <a:buNone/>
-            </a:pPr>
-            <a:r>
-              <a:rPr sz="1800">
-                <a:latin typeface="Courier"/>
-              </a:rPr>
-              <a:t>##        time                   event
-## 1 2:00-2:15      Welcome and Intros
-## 2 2:15-2:30  Intro to data cleaning
-## 3 2:30-2:45                   Break
-## 4 2:45-3:30 Data cleaning exercises
-## 5 3:30-3:45                   Break
-## 6 3:45-4:45      Data visualization
-## 7 4:45-5:00                Goodbye!</a:t>
-            </a:r>
-          </a:p>
-        </p:txBody>
-      </p:sp>
-    </p:spTree>
-  </p:cSld>
-</p:sld>
-</file>
-
-<file path=ppt/slides/slide9.xml><?xml version="1.0" encoding="utf-8"?>
-<p:sld xmlns:a="http://schemas.openxmlformats.org/drawingml/2006/main" xmlns:r="http://schemas.openxmlformats.org/officeDocument/2006/relationships" xmlns:p="http://schemas.openxmlformats.org/presentationml/2006/main">
-  <p:cSld>
-    <p:spTree>
-      <p:nvGrpSpPr>
-        <p:cNvPr id="1" name=""/>
-        <p:cNvGrpSpPr/>
-        <p:nvPr/>
-      </p:nvGrpSpPr>
-      <p:grpSpPr>
-        <a:xfrm>
-          <a:off x="0" y="0"/>
-          <a:ext cx="0" cy="0"/>
-          <a:chOff x="0" y="0"/>
-          <a:chExt cx="0" cy="0"/>
-        </a:xfrm>
-      </p:grpSpPr>
-      <p:sp>
-        <p:nvSpPr>
-          <p:cNvPr id="2" name="Title 1">
-            <a:extLst>
-              <a:ext uri="{FF2B5EF4-FFF2-40B4-BE49-F238E27FC236}">
-                <a16:creationId xmlns:a16="http://schemas.microsoft.com/office/drawing/2014/main" id="{46F9623C-E77C-5144-BEE9-0F0BBBA1D88F}"/>
-              </a:ext>
-            </a:extLst>
-          </p:cNvPr>
-          <p:cNvSpPr>
-            <a:spLocks noGrp="1"/>
-          </p:cNvSpPr>
-          <p:nvPr>
-            <p:ph type="title"/>
-          </p:nvPr>
-        </p:nvSpPr>
-        <p:spPr/>
-        <p:txBody>
-          <a:bodyPr/>
-          <a:lstStyle/>
-          <a:p>
-            <a:pPr lvl="0" marL="0" indent="0">
-              <a:buNone/>
-            </a:pPr>
-            <a:r>
-              <a:rPr/>
-              <a:t>Get</a:t>
+              <a:t>Link</a:t>
             </a:r>
             <a:r>
               <a:rPr/>

</xml_diff>